<commit_message>
slight changes to replan
</commit_message>
<xml_diff>
--- a/2023-PGDay-Israel/raw_schemas.pptx
+++ b/2023-PGDay-Israel/raw_schemas.pptx
@@ -4244,7 +4244,7 @@
           <p:nvPr/>
         </p:nvSpPr>
         <p:spPr bwMode="auto">
-          <a:xfrm rot="5399977">
+          <a:xfrm rot="5399976">
             <a:off x="5547168" y="1788570"/>
             <a:ext cx="170099" cy="1779300"/>
           </a:xfrm>
@@ -4297,7 +4297,7 @@
           <p:nvPr/>
         </p:nvSpPr>
         <p:spPr bwMode="auto">
-          <a:xfrm rot="5399977" flipH="0" flipV="0">
+          <a:xfrm rot="5399976" flipH="0" flipV="0">
             <a:off x="6286372" y="1374928"/>
             <a:ext cx="170099" cy="3216186"/>
           </a:xfrm>
@@ -4350,7 +4350,7 @@
           <p:nvPr/>
         </p:nvSpPr>
         <p:spPr bwMode="auto">
-          <a:xfrm rot="5399977">
+          <a:xfrm rot="5399976">
             <a:off x="6826298" y="1120296"/>
             <a:ext cx="170099" cy="4338000"/>
           </a:xfrm>
@@ -4906,7 +4906,7 @@
           <p:nvPr/>
         </p:nvSpPr>
         <p:spPr bwMode="auto">
-          <a:xfrm rot="5399977">
+          <a:xfrm rot="5399976">
             <a:off x="4842524" y="3407521"/>
             <a:ext cx="170099" cy="370199"/>
           </a:xfrm>
@@ -5247,7 +5247,7 @@
           <p:nvPr/>
         </p:nvCxnSpPr>
         <p:spPr bwMode="auto">
-          <a:xfrm rot="-5399977" flipH="1">
+          <a:xfrm rot="-5399976" flipH="1">
             <a:off x="4983723" y="1595070"/>
             <a:ext cx="599" cy="1296000"/>
           </a:xfrm>
@@ -5633,10 +5633,10 @@
               <a:defRPr/>
             </a:pPr>
             <a:r>
-              <a:rPr lang="en-GB"/>
+              <a:rPr lang="en-GB" sz="1400"/>
               <a:t>Raw parse tree</a:t>
             </a:r>
-            <a:endParaRPr/>
+            <a:endParaRPr sz="1400"/>
           </a:p>
         </p:txBody>
       </p:sp>
@@ -5686,10 +5686,10 @@
               <a:defRPr/>
             </a:pPr>
             <a:r>
-              <a:rPr lang="en-GB"/>
+              <a:rPr lang="en-GB" sz="1400"/>
               <a:t>parse tree</a:t>
             </a:r>
-            <a:endParaRPr/>
+            <a:endParaRPr sz="1400"/>
           </a:p>
         </p:txBody>
       </p:sp>
@@ -5739,10 +5739,10 @@
               <a:defRPr/>
             </a:pPr>
             <a:r>
-              <a:rPr lang="en-GB"/>
+              <a:rPr lang="en-GB" sz="1400"/>
               <a:t>parse tree</a:t>
             </a:r>
-            <a:endParaRPr/>
+            <a:endParaRPr sz="1400"/>
           </a:p>
         </p:txBody>
       </p:sp>
@@ -5792,10 +5792,10 @@
               <a:defRPr/>
             </a:pPr>
             <a:r>
-              <a:rPr lang="en-GB"/>
+              <a:rPr lang="en-GB" sz="1400"/>
               <a:t>parse tree</a:t>
             </a:r>
-            <a:endParaRPr/>
+            <a:endParaRPr sz="1400"/>
           </a:p>
         </p:txBody>
       </p:sp>
@@ -5806,9 +5806,9 @@
           <p:nvPr/>
         </p:nvSpPr>
         <p:spPr bwMode="auto">
-          <a:xfrm>
-            <a:off x="4985524" y="2398500"/>
-            <a:ext cx="1344335" cy="731525"/>
+          <a:xfrm flipH="0" flipV="0">
+            <a:off x="4985523" y="2347290"/>
+            <a:ext cx="1816277" cy="426721"/>
           </a:xfrm>
           <a:prstGeom prst="rect">
             <a:avLst/>
@@ -5819,7 +5819,7 @@
           </a:ln>
         </p:spPr>
         <p:txBody>
-          <a:bodyPr spcFirstLastPara="1" wrap="square" lIns="91423" tIns="91423" rIns="91423" bIns="91423" anchor="t" anchorCtr="0">
+          <a:bodyPr spcFirstLastPara="1" wrap="square" lIns="91422" tIns="91422" rIns="91422" bIns="91422" anchor="t" anchorCtr="0">
             <a:spAutoFit/>
           </a:bodyPr>
           <a:lstStyle/>
@@ -5835,10 +5835,10 @@
               <a:defRPr/>
             </a:pPr>
             <a:r>
-              <a:rPr lang="en-GB"/>
+              <a:rPr lang="en-GB" sz="1600"/>
               <a:t>Rewrite query</a:t>
             </a:r>
-            <a:endParaRPr/>
+            <a:endParaRPr sz="1600"/>
           </a:p>
         </p:txBody>
       </p:sp>
@@ -6032,8 +6032,8 @@
         </p:nvSpPr>
         <p:spPr bwMode="auto">
           <a:xfrm>
-            <a:off x="4985524" y="3541500"/>
-            <a:ext cx="1344335" cy="457205"/>
+            <a:off x="4985523" y="3541500"/>
+            <a:ext cx="1344370" cy="426721"/>
           </a:xfrm>
           <a:prstGeom prst="rect">
             <a:avLst/>
@@ -6060,7 +6060,7 @@
               <a:defRPr/>
             </a:pPr>
             <a:r>
-              <a:rPr lang="en-GB"/>
+              <a:rPr lang="en-GB" sz="1600"/>
               <a:t>Planning</a:t>
             </a:r>
             <a:endParaRPr/>
@@ -6607,7 +6607,7 @@
                 <p:nvPr/>
               </p:nvCxnSpPr>
               <p:spPr bwMode="auto">
-                <a:xfrm rot="5399977" flipH="0" flipV="0">
+                <a:xfrm rot="5399976" flipH="0" flipV="0">
                   <a:off x="-91364" y="1512676"/>
                   <a:ext cx="371025" cy="188294"/>
                 </a:xfrm>
@@ -6650,7 +6650,7 @@
                 <p:nvPr/>
               </p:nvCxnSpPr>
               <p:spPr bwMode="auto">
-                <a:xfrm rot="5399977" flipH="0" flipV="1">
+                <a:xfrm rot="5399976" flipH="0" flipV="1">
                   <a:off x="750168" y="1536693"/>
                   <a:ext cx="371025" cy="140262"/>
                 </a:xfrm>
@@ -6797,7 +6797,7 @@
                 <p:nvPr/>
               </p:nvCxnSpPr>
               <p:spPr bwMode="auto">
-                <a:xfrm rot="5399977" flipH="0" flipV="0">
+                <a:xfrm rot="5399976" flipH="0" flipV="0">
                   <a:off x="780653" y="635642"/>
                   <a:ext cx="414308" cy="244518"/>
                 </a:xfrm>
@@ -6895,7 +6895,7 @@
                 <p:nvPr/>
               </p:nvCxnSpPr>
               <p:spPr bwMode="auto">
-                <a:xfrm rot="5399977" flipH="0" flipV="1">
+                <a:xfrm rot="5399976" flipH="0" flipV="1">
                   <a:off x="1738513" y="599554"/>
                   <a:ext cx="319814" cy="222199"/>
                 </a:xfrm>
@@ -6992,7 +6992,7 @@
             <p:nvPr/>
           </p:nvCxnSpPr>
           <p:spPr bwMode="auto">
-            <a:xfrm rot="5399977" flipH="0" flipV="0">
+            <a:xfrm rot="5399976" flipH="0" flipV="0">
               <a:off x="1677157" y="775247"/>
               <a:ext cx="260011" cy="0"/>
             </a:xfrm>
@@ -7171,7 +7171,7 @@
               <p:nvPr/>
             </p:nvCxnSpPr>
             <p:spPr bwMode="auto">
-              <a:xfrm rot="5399977" flipH="0" flipV="0">
+              <a:xfrm rot="5399976" flipH="0" flipV="0">
                 <a:off x="267102" y="1512676"/>
                 <a:ext cx="371025" cy="188294"/>
               </a:xfrm>
@@ -7214,7 +7214,7 @@
               <p:nvPr/>
             </p:nvCxnSpPr>
             <p:spPr bwMode="auto">
-              <a:xfrm rot="5399977" flipH="0" flipV="1">
+              <a:xfrm rot="5399976" flipH="0" flipV="1">
                 <a:off x="1108635" y="1536693"/>
                 <a:ext cx="371025" cy="140262"/>
               </a:xfrm>
@@ -7361,7 +7361,7 @@
               <p:nvPr/>
             </p:nvCxnSpPr>
             <p:spPr bwMode="auto">
-              <a:xfrm rot="5399977" flipH="0" flipV="0">
+              <a:xfrm rot="5399976" flipH="0" flipV="0">
                 <a:off x="1139121" y="635642"/>
                 <a:ext cx="414308" cy="244518"/>
               </a:xfrm>
@@ -7459,7 +7459,7 @@
               <p:nvPr/>
             </p:nvCxnSpPr>
             <p:spPr bwMode="auto">
-              <a:xfrm rot="5399977" flipH="0" flipV="1">
+              <a:xfrm rot="5399976" flipH="0" flipV="1">
                 <a:off x="2096982" y="599555"/>
                 <a:ext cx="319814" cy="222199"/>
               </a:xfrm>
@@ -7555,7 +7555,7 @@
             <p:nvPr/>
           </p:nvCxnSpPr>
           <p:spPr bwMode="auto">
-            <a:xfrm rot="5399977" flipH="0" flipV="1">
+            <a:xfrm rot="5399976" flipH="0" flipV="1">
               <a:off x="1678433" y="766742"/>
               <a:ext cx="243001" cy="0"/>
             </a:xfrm>
@@ -7631,7 +7631,7 @@
         </p:nvGrpSpPr>
         <p:grpSpPr bwMode="auto">
           <a:xfrm flipH="0" flipV="0">
-            <a:off x="7431199" y="784752"/>
+            <a:off x="3451274" y="3695088"/>
             <a:ext cx="1224290" cy="1786044"/>
             <a:chOff x="0" y="0"/>
             <a:chExt cx="1224290" cy="1786044"/>
@@ -7759,7 +7759,7 @@
               <p:nvPr/>
             </p:nvCxnSpPr>
             <p:spPr bwMode="auto">
-              <a:xfrm rot="5399978" flipH="0" flipV="0">
+              <a:xfrm rot="5399976" flipH="0" flipV="0">
                 <a:off x="103617" y="820625"/>
                 <a:ext cx="199248" cy="84551"/>
               </a:xfrm>
@@ -7802,7 +7802,7 @@
               <p:nvPr/>
             </p:nvCxnSpPr>
             <p:spPr bwMode="auto">
-              <a:xfrm rot="5399978" flipH="0" flipV="1">
+              <a:xfrm rot="5399976" flipH="0" flipV="1">
                 <a:off x="481500" y="831410"/>
                 <a:ext cx="199248" cy="62983"/>
               </a:xfrm>
@@ -7941,7 +7941,7 @@
               <p:nvPr/>
             </p:nvCxnSpPr>
             <p:spPr bwMode="auto">
-              <a:xfrm rot="5399978" flipH="0" flipV="0">
+              <a:xfrm rot="5399976" flipH="0" flipV="0">
                 <a:off x="493286" y="352111"/>
                 <a:ext cx="222492" cy="109798"/>
               </a:xfrm>
@@ -8035,7 +8035,7 @@
               <p:nvPr/>
             </p:nvCxnSpPr>
             <p:spPr bwMode="auto">
-              <a:xfrm rot="5399978" flipH="0" flipV="1">
+              <a:xfrm rot="5399976" flipH="0" flipV="1">
                 <a:off x="927561" y="331749"/>
                 <a:ext cx="171747" cy="99776"/>
               </a:xfrm>
@@ -8127,7 +8127,7 @@
             <p:nvPr/>
           </p:nvCxnSpPr>
           <p:spPr bwMode="auto">
-            <a:xfrm rot="5399978" flipH="0" flipV="1">
+            <a:xfrm rot="5399976" flipH="0" flipV="1">
               <a:off x="742995" y="411758"/>
               <a:ext cx="130497" cy="0"/>
             </a:xfrm>
@@ -8329,7 +8329,7 @@
           </p:nvSpPr>
           <p:spPr bwMode="auto">
             <a:xfrm>
-              <a:off x="5130987" y="3040464"/>
+              <a:off x="5130986" y="3040464"/>
               <a:ext cx="249599" cy="222300"/>
             </a:xfrm>
             <a:prstGeom prst="rect">
@@ -8661,7 +8661,7 @@
             <p:nvPr/>
           </p:nvCxnSpPr>
           <p:spPr bwMode="auto">
-            <a:xfrm rot="5399978" flipH="0" flipV="1">
+            <a:xfrm rot="5399976" flipH="0" flipV="1">
               <a:off x="2625264" y="2143707"/>
               <a:ext cx="1306958" cy="486555"/>
             </a:xfrm>
@@ -8693,7 +8693,7 @@
             <p:nvPr/>
           </p:nvCxnSpPr>
           <p:spPr bwMode="auto">
-            <a:xfrm rot="5399978" flipH="0" flipV="1">
+            <a:xfrm rot="5399976" flipH="0" flipV="1">
               <a:off x="3630832" y="2158675"/>
               <a:ext cx="1306958" cy="456619"/>
             </a:xfrm>
@@ -8724,7 +8724,7 @@
             <p:nvPr/>
           </p:nvCxnSpPr>
           <p:spPr bwMode="auto">
-            <a:xfrm rot="5399978" flipH="0" flipV="0">
+            <a:xfrm rot="5399976" flipH="0" flipV="0">
               <a:off x="4298467" y="2197040"/>
               <a:ext cx="1306958" cy="379888"/>
             </a:xfrm>
@@ -8824,7 +8824,7 @@
             </a:ln>
           </p:spPr>
           <p:txBody>
-            <a:bodyPr spcFirstLastPara="1" wrap="square" lIns="91424" tIns="91424" rIns="91424" bIns="91424" anchor="t" anchorCtr="0">
+            <a:bodyPr spcFirstLastPara="1" wrap="square" lIns="91423" tIns="91423" rIns="91423" bIns="91423" anchor="t" anchorCtr="0">
               <a:noAutofit/>
             </a:bodyPr>
             <a:lstStyle/>
@@ -8922,7 +8922,7 @@
             </a:ln>
           </p:spPr>
           <p:txBody>
-            <a:bodyPr spcFirstLastPara="1" wrap="square" lIns="91424" tIns="91424" rIns="91424" bIns="91424" anchor="t" anchorCtr="0">
+            <a:bodyPr spcFirstLastPara="1" wrap="square" lIns="91423" tIns="91423" rIns="91423" bIns="91423" anchor="t" anchorCtr="0">
               <a:noAutofit/>
             </a:bodyPr>
             <a:lstStyle/>
@@ -8969,7 +8969,7 @@
             </a:ln>
           </p:spPr>
           <p:txBody>
-            <a:bodyPr spcFirstLastPara="1" wrap="square" lIns="91424" tIns="91424" rIns="91424" bIns="91424" anchor="t" anchorCtr="0">
+            <a:bodyPr spcFirstLastPara="1" wrap="square" lIns="91423" tIns="91423" rIns="91423" bIns="91423" anchor="t" anchorCtr="0">
               <a:noAutofit/>
             </a:bodyPr>
             <a:lstStyle/>
@@ -9315,7 +9315,7 @@
             </a:ln>
           </p:spPr>
           <p:txBody>
-            <a:bodyPr spcFirstLastPara="1" wrap="square" lIns="91424" tIns="91424" rIns="91424" bIns="91424" anchor="t" anchorCtr="0">
+            <a:bodyPr spcFirstLastPara="1" wrap="square" lIns="91423" tIns="91423" rIns="91423" bIns="91423" anchor="t" anchorCtr="0">
               <a:noAutofit/>
             </a:bodyPr>
             <a:lstStyle/>
@@ -9409,7 +9409,7 @@
             </a:ln>
           </p:spPr>
           <p:txBody>
-            <a:bodyPr spcFirstLastPara="1" wrap="square" lIns="91424" tIns="91424" rIns="91424" bIns="91424" anchor="t" anchorCtr="0">
+            <a:bodyPr spcFirstLastPara="1" wrap="square" lIns="91423" tIns="91423" rIns="91423" bIns="91423" anchor="t" anchorCtr="0">
               <a:noAutofit/>
             </a:bodyPr>
             <a:lstStyle/>
@@ -9531,7 +9531,7 @@
           <p:spPr bwMode="auto">
             <a:xfrm rot="0" flipH="0" flipV="1">
               <a:off x="2009571" y="1048792"/>
-              <a:ext cx="671035" cy="0"/>
+              <a:ext cx="671034" cy="0"/>
             </a:xfrm>
             <a:prstGeom prst="straightConnector1">
               <a:avLst/>
@@ -9882,8 +9882,8 @@
         </p:nvSpPr>
         <p:spPr bwMode="auto">
           <a:xfrm rot="0" flipH="0" flipV="0">
-            <a:off x="8840285" y="1261760"/>
-            <a:ext cx="792574" cy="702372"/>
+            <a:off x="4860360" y="4172096"/>
+            <a:ext cx="400041" cy="702371"/>
           </a:xfrm>
           <a:prstGeom prst="rightArrow">
             <a:avLst>
@@ -9933,8 +9933,8 @@
         </p:nvSpPr>
         <p:spPr bwMode="auto">
           <a:xfrm flipH="0" flipV="0">
-            <a:off x="9744107" y="1442356"/>
-            <a:ext cx="1481641" cy="365795"/>
+            <a:off x="5347338" y="4387820"/>
+            <a:ext cx="1033281" cy="259115"/>
           </a:xfrm>
           <a:prstGeom prst="rect">
             <a:avLst/>
@@ -9956,7 +9956,7 @@
               <a:defRPr/>
             </a:pPr>
             <a:r>
-              <a:rPr lang="ru-RU" sz="1800" b="1" i="0" u="none" strike="noStrike" cap="none" spc="0">
+              <a:rPr lang="ru-RU" sz="1100" b="1" i="0" u="none" strike="noStrike" cap="none" spc="0">
                 <a:solidFill>
                   <a:schemeClr val="tx1"/>
                 </a:solidFill>
@@ -10147,7 +10147,7 @@
               <p:nvPr/>
             </p:nvCxnSpPr>
             <p:spPr bwMode="auto">
-              <a:xfrm rot="5399943" flipH="0" flipV="0">
+              <a:xfrm rot="5399942" flipH="0" flipV="0">
                 <a:off x="267102" y="1512676"/>
                 <a:ext cx="371025" cy="188293"/>
               </a:xfrm>
@@ -10190,7 +10190,7 @@
               <p:nvPr/>
             </p:nvCxnSpPr>
             <p:spPr bwMode="auto">
-              <a:xfrm rot="5399943" flipH="0" flipV="1">
+              <a:xfrm rot="5399942" flipH="0" flipV="1">
                 <a:off x="1108634" y="1536692"/>
                 <a:ext cx="371025" cy="140261"/>
               </a:xfrm>
@@ -10337,7 +10337,7 @@
               <p:nvPr/>
             </p:nvCxnSpPr>
             <p:spPr bwMode="auto">
-              <a:xfrm rot="5399943" flipH="0" flipV="0">
+              <a:xfrm rot="5399942" flipH="0" flipV="0">
                 <a:off x="1139121" y="635641"/>
                 <a:ext cx="414307" cy="244517"/>
               </a:xfrm>
@@ -10431,7 +10431,7 @@
               <p:nvPr/>
             </p:nvCxnSpPr>
             <p:spPr bwMode="auto">
-              <a:xfrm rot="5399943" flipH="0" flipV="1">
+              <a:xfrm rot="5399942" flipH="0" flipV="1">
                 <a:off x="2096982" y="599554"/>
                 <a:ext cx="319814" cy="222198"/>
               </a:xfrm>
@@ -10523,8 +10523,8 @@
             <p:nvPr/>
           </p:nvCxnSpPr>
           <p:spPr bwMode="auto">
-            <a:xfrm rot="5399943" flipH="0" flipV="1">
-              <a:off x="1678432" y="766741"/>
+            <a:xfrm rot="5399942" flipH="0" flipV="1">
+              <a:off x="1678431" y="766741"/>
               <a:ext cx="243000" cy="0"/>
             </a:xfrm>
             <a:prstGeom prst="line">
@@ -10749,7 +10749,7 @@
               <p:nvPr/>
             </p:nvCxnSpPr>
             <p:spPr bwMode="auto">
-              <a:xfrm rot="5399943" flipH="0" flipV="0">
+              <a:xfrm rot="5399942" flipH="0" flipV="0">
                 <a:off x="267102" y="1512675"/>
                 <a:ext cx="371025" cy="188293"/>
               </a:xfrm>
@@ -10792,7 +10792,7 @@
               <p:nvPr/>
             </p:nvCxnSpPr>
             <p:spPr bwMode="auto">
-              <a:xfrm rot="5399943" flipH="0" flipV="1">
+              <a:xfrm rot="5399942" flipH="0" flipV="1">
                 <a:off x="1108634" y="1536692"/>
                 <a:ext cx="371025" cy="140261"/>
               </a:xfrm>
@@ -10939,7 +10939,7 @@
               <p:nvPr/>
             </p:nvCxnSpPr>
             <p:spPr bwMode="auto">
-              <a:xfrm rot="5399943" flipH="0" flipV="0">
+              <a:xfrm rot="5399942" flipH="0" flipV="0">
                 <a:off x="1139121" y="635641"/>
                 <a:ext cx="414307" cy="244517"/>
               </a:xfrm>
@@ -11033,7 +11033,7 @@
               <p:nvPr/>
             </p:nvCxnSpPr>
             <p:spPr bwMode="auto">
-              <a:xfrm rot="5399943" flipH="0" flipV="1">
+              <a:xfrm rot="5399942" flipH="0" flipV="1">
                 <a:off x="2096982" y="599554"/>
                 <a:ext cx="319813" cy="222198"/>
               </a:xfrm>
@@ -11125,8 +11125,8 @@
             <p:nvPr/>
           </p:nvCxnSpPr>
           <p:spPr bwMode="auto">
-            <a:xfrm rot="5399943" flipH="0" flipV="1">
-              <a:off x="1678432" y="766741"/>
+            <a:xfrm rot="5399942" flipH="0" flipV="1">
+              <a:off x="1678431" y="766741"/>
               <a:ext cx="243000" cy="0"/>
             </a:xfrm>
             <a:prstGeom prst="line">
@@ -11180,7 +11180,7 @@
           </a:ln>
         </p:spPr>
         <p:txBody>
-          <a:bodyPr spcFirstLastPara="1" wrap="square" lIns="91424" tIns="91424" rIns="91424" bIns="91424" anchor="t" anchorCtr="0">
+          <a:bodyPr spcFirstLastPara="1" wrap="square" lIns="91423" tIns="91423" rIns="91423" bIns="91423" anchor="t" anchorCtr="0">
             <a:spAutoFit/>
           </a:bodyPr>
           <a:lstStyle/>
@@ -11240,7 +11240,7 @@
           </a:ln>
         </p:spPr>
         <p:txBody>
-          <a:bodyPr spcFirstLastPara="1" wrap="square" lIns="91424" tIns="91424" rIns="91424" bIns="91424" anchor="t" anchorCtr="0">
+          <a:bodyPr spcFirstLastPara="1" wrap="square" lIns="91423" tIns="91423" rIns="91423" bIns="91423" anchor="t" anchorCtr="0">
             <a:spAutoFit/>
           </a:bodyPr>
           <a:lstStyle/>
@@ -11274,7 +11274,7 @@
           <p:nvPr/>
         </p:nvCxnSpPr>
         <p:spPr bwMode="auto">
-          <a:xfrm rot="5399978" flipH="1" flipV="0">
+          <a:xfrm rot="5399976" flipH="1" flipV="0">
             <a:off x="7739814" y="4612737"/>
             <a:ext cx="764119" cy="3123496"/>
           </a:xfrm>
@@ -11316,7 +11316,7 @@
           <p:nvPr/>
         </p:nvSpPr>
         <p:spPr bwMode="auto">
-          <a:xfrm rot="1559980" flipH="0" flipV="0">
+          <a:xfrm rot="1559978" flipH="0" flipV="0">
             <a:off x="8110800" y="4190400"/>
             <a:ext cx="1102178" cy="659783"/>
           </a:xfrm>
@@ -12166,7 +12166,7 @@
           <p:nvPr/>
         </p:nvCxnSpPr>
         <p:spPr bwMode="auto">
-          <a:xfrm rot="5399978" flipH="0" flipV="1">
+          <a:xfrm rot="5399976" flipH="0" flipV="1">
             <a:off x="2344962" y="2450172"/>
             <a:ext cx="339194" cy="0"/>
           </a:xfrm>
@@ -12210,7 +12210,7 @@
           <p:nvPr/>
         </p:nvCxnSpPr>
         <p:spPr bwMode="auto">
-          <a:xfrm rot="5399978" flipH="0" flipV="0">
+          <a:xfrm rot="5399976" flipH="0" flipV="0">
             <a:off x="2344962" y="3198565"/>
             <a:ext cx="339193" cy="0"/>
           </a:xfrm>
@@ -12252,7 +12252,7 @@
           <p:nvPr/>
         </p:nvCxnSpPr>
         <p:spPr bwMode="auto">
-          <a:xfrm rot="5399978" flipH="0" flipV="1">
+          <a:xfrm rot="5399976" flipH="0" flipV="1">
             <a:off x="2344961" y="1695789"/>
             <a:ext cx="339193" cy="0"/>
           </a:xfrm>
@@ -12294,7 +12294,7 @@
           <p:nvPr/>
         </p:nvCxnSpPr>
         <p:spPr bwMode="auto">
-          <a:xfrm rot="5399978" flipH="0" flipV="1">
+          <a:xfrm rot="5399976" flipH="0" flipV="1">
             <a:off x="2344961" y="3957977"/>
             <a:ext cx="339193" cy="0"/>
           </a:xfrm>
@@ -12663,8 +12663,8 @@
           <p:nvPr/>
         </p:nvCxnSpPr>
         <p:spPr bwMode="auto">
-          <a:xfrm rot="10799990" flipH="0" flipV="1">
-            <a:off x="3278468" y="2864222"/>
+          <a:xfrm rot="10799989" flipH="0" flipV="1">
+            <a:off x="3278468" y="2864221"/>
             <a:ext cx="933943" cy="0"/>
           </a:xfrm>
           <a:prstGeom prst="bentConnector3">
@@ -12880,7 +12880,7 @@
           </p:nvSpPr>
           <p:spPr bwMode="auto">
             <a:xfrm rot="0" flipH="0" flipV="0">
-              <a:off x="2609" y="0"/>
+              <a:off x="2608" y="0"/>
               <a:ext cx="93600" cy="93600"/>
             </a:xfrm>
             <a:prstGeom prst="ellipse">
@@ -13006,7 +13006,7 @@
         <p:spPr bwMode="auto">
           <a:xfrm flipH="0" flipV="0">
             <a:off x="3143291" y="2436494"/>
-            <a:ext cx="1238814" cy="274356"/>
+            <a:ext cx="1238813" cy="274356"/>
           </a:xfrm>
           <a:prstGeom prst="rect">
             <a:avLst/>
@@ -13326,7 +13326,7 @@
         </p:nvCxnSpPr>
         <p:spPr bwMode="auto">
           <a:xfrm rot="0" flipH="0" flipV="1">
-            <a:off x="1534499" y="403012"/>
+            <a:off x="1534498" y="403012"/>
             <a:ext cx="894616" cy="0"/>
           </a:xfrm>
           <a:prstGeom prst="line">
@@ -13472,7 +13472,7 @@
         </p:nvSpPr>
         <p:spPr bwMode="auto">
           <a:xfrm flipH="0" flipV="0">
-            <a:off x="1861239" y="3571873"/>
+            <a:off x="1861239" y="3571872"/>
             <a:ext cx="1940208" cy="866773"/>
           </a:xfrm>
           <a:prstGeom prst="rect">

</xml_diff>